<commit_message>
Presemtation updated with apk
</commit_message>
<xml_diff>
--- a/Wildtracer-app-presentation.pptx
+++ b/Wildtracer-app-presentation.pptx
@@ -234,7 +234,7 @@
           <a:p>
             <a:fld id="{C2CC809A-047D-4C4C-99AD-66B485108806}" type="datetimeFigureOut">
               <a:rPr lang="es-ES" smtClean="0"/>
-              <a:t>01/08/2022</a:t>
+              <a:t>10/08/2022</a:t>
             </a:fld>
             <a:endParaRPr lang="es-ES"/>
           </a:p>
@@ -411,7 +411,7 @@
           <a:p>
             <a:fld id="{8D7ED65C-1759-EA41-A662-092C252C0EBD}" type="datetimeFigureOut">
               <a:rPr lang="es-ES" smtClean="0"/>
-              <a:t>01/08/2022</a:t>
+              <a:t>10/08/2022</a:t>
             </a:fld>
             <a:endParaRPr lang="es-ES"/>
           </a:p>
@@ -1282,7 +1282,7 @@
           <a:p>
             <a:fld id="{EDBEB5F8-2220-7044-B131-05899ACF52F6}" type="datetimeFigureOut">
               <a:rPr lang="es-ES" smtClean="0"/>
-              <a:t>01/08/2022</a:t>
+              <a:t>10/08/2022</a:t>
             </a:fld>
             <a:endParaRPr lang="es-ES"/>
           </a:p>
@@ -1431,7 +1431,7 @@
           <a:p>
             <a:fld id="{EDBEB5F8-2220-7044-B131-05899ACF52F6}" type="datetimeFigureOut">
               <a:rPr lang="es-ES" smtClean="0"/>
-              <a:t>01/08/2022</a:t>
+              <a:t>10/08/2022</a:t>
             </a:fld>
             <a:endParaRPr lang="es-ES"/>
           </a:p>
@@ -5151,7 +5151,7 @@
           <a:p>
             <a:fld id="{3BAC57A4-A4BD-254B-A2D6-FC8851E329C2}" type="datetimeFigureOut">
               <a:rPr lang="es-ES" smtClean="0"/>
-              <a:t>01/08/2022</a:t>
+              <a:t>10/08/2022</a:t>
             </a:fld>
             <a:endParaRPr lang="es-ES"/>
           </a:p>
@@ -6859,7 +6859,7 @@
                 </a:solidFill>
                 <a:cs typeface="Arial" panose="020B0604020202020204" pitchFamily="34" charset="0"/>
               </a:rPr>
-              <a:t> a </a:t>
+              <a:t> </a:t>
             </a:r>
             <a:r>
               <a:rPr lang="es-ES" sz="2000" dirty="0" err="1">
@@ -6871,7 +6871,7 @@
                 </a:solidFill>
                 <a:cs typeface="Arial" panose="020B0604020202020204" pitchFamily="34" charset="0"/>
               </a:rPr>
-              <a:t>one</a:t>
+              <a:t>the</a:t>
             </a:r>
             <a:r>
               <a:rPr lang="es-ES" sz="2000" dirty="0">
@@ -6895,31 +6895,7 @@
                 </a:solidFill>
                 <a:cs typeface="Arial" panose="020B0604020202020204" pitchFamily="34" charset="0"/>
               </a:rPr>
-              <a:t>of</a:t>
-            </a:r>
-            <a:r>
-              <a:rPr lang="es-ES" sz="2000" dirty="0">
-                <a:solidFill>
-                  <a:schemeClr val="tx1">
-                    <a:lumMod val="75000"/>
-                    <a:lumOff val="25000"/>
-                  </a:schemeClr>
-                </a:solidFill>
-                <a:cs typeface="Arial" panose="020B0604020202020204" pitchFamily="34" charset="0"/>
-              </a:rPr>
-              <a:t> a </a:t>
-            </a:r>
-            <a:r>
-              <a:rPr lang="es-ES" sz="2000" dirty="0" err="1">
-                <a:solidFill>
-                  <a:schemeClr val="tx1">
-                    <a:lumMod val="75000"/>
-                    <a:lumOff val="25000"/>
-                  </a:schemeClr>
-                </a:solidFill>
-                <a:cs typeface="Arial" panose="020B0604020202020204" pitchFamily="34" charset="0"/>
-              </a:rPr>
-              <a:t>kind</a:t>
+              <a:t>only</a:t>
             </a:r>
             <a:r>
               <a:rPr lang="es-ES" sz="2000" dirty="0">
@@ -9285,13 +9261,30 @@
             <p:ph type="title"/>
           </p:nvPr>
         </p:nvSpPr>
-        <p:spPr/>
+        <p:spPr>
+          <a:xfrm>
+            <a:off x="838200" y="365126"/>
+            <a:ext cx="10515600" cy="860360"/>
+          </a:xfrm>
+        </p:spPr>
         <p:txBody>
-          <a:bodyPr/>
+          <a:bodyPr>
+            <a:normAutofit/>
+          </a:bodyPr>
           <a:lstStyle/>
           <a:p>
             <a:r>
-              <a:rPr lang="en-US" dirty="0"/>
+              <a:rPr lang="en-US" b="1" dirty="0">
+                <a:solidFill>
+                  <a:schemeClr val="tx1">
+                    <a:lumMod val="85000"/>
+                    <a:lumOff val="15000"/>
+                  </a:schemeClr>
+                </a:solidFill>
+                <a:latin typeface="+mn-lt"/>
+                <a:ea typeface="+mn-ea"/>
+                <a:cs typeface="Arial" panose="020B0604020202020204" pitchFamily="34" charset="0"/>
+              </a:rPr>
               <a:t>Machine Learning</a:t>
             </a:r>
           </a:p>
@@ -9383,6 +9376,41 @@
           </a:prstGeom>
         </p:spPr>
       </p:pic>
+      <p:sp>
+        <p:nvSpPr>
+          <p:cNvPr id="3" name="TextBox 2">
+            <a:extLst>
+              <a:ext uri="{FF2B5EF4-FFF2-40B4-BE49-F238E27FC236}">
+                <a16:creationId xmlns:a16="http://schemas.microsoft.com/office/drawing/2014/main" id="{5FD5432E-0EBD-FA42-E322-D39E0BDF979B}"/>
+              </a:ext>
+            </a:extLst>
+          </p:cNvPr>
+          <p:cNvSpPr txBox="1"/>
+          <p:nvPr/>
+        </p:nvSpPr>
+        <p:spPr>
+          <a:xfrm>
+            <a:off x="1037612" y="1242525"/>
+            <a:ext cx="8148384" cy="369332"/>
+          </a:xfrm>
+          <a:prstGeom prst="rect">
+            <a:avLst/>
+          </a:prstGeom>
+          <a:noFill/>
+        </p:spPr>
+        <p:txBody>
+          <a:bodyPr wrap="none" rtlCol="0">
+            <a:spAutoFit/>
+          </a:bodyPr>
+          <a:lstStyle/>
+          <a:p>
+            <a:r>
+              <a:rPr lang="en-US" dirty="0"/>
+              <a:t>Predicts which animals are more vulnerable and which routes are mostly used.</a:t>
+            </a:r>
+          </a:p>
+        </p:txBody>
+      </p:sp>
     </p:spTree>
     <p:extLst>
       <p:ext uri="{BB962C8B-B14F-4D97-AF65-F5344CB8AC3E}">
@@ -9857,7 +9885,7 @@
                 <a:ea typeface="+mn-ea"/>
                 <a:cs typeface="Arial" panose="020B0604020202020204" pitchFamily="34" charset="0"/>
               </a:rPr>
-              <a:t>APK and Video</a:t>
+              <a:t>APK of the App</a:t>
             </a:r>
           </a:p>
         </p:txBody>
@@ -9883,7 +9911,28 @@
           <a:bodyPr/>
           <a:lstStyle/>
           <a:p>
-            <a:endParaRPr lang="en-US"/>
+            <a:r>
+              <a:rPr lang="en-US" dirty="0"/>
+              <a:t>APK of the app:</a:t>
+            </a:r>
+          </a:p>
+          <a:p>
+            <a:pPr marL="0" indent="0">
+              <a:buNone/>
+            </a:pPr>
+            <a:r>
+              <a:rPr lang="en-US" dirty="0">
+                <a:hlinkClick r:id="rId2"/>
+              </a:rPr>
+              <a:t>https://drive.google.com/file/d/1o505BFl3-tc_GcSgbSmtWcAMsNa8W6cc/view?usp=sharing</a:t>
+            </a:r>
+            <a:endParaRPr lang="en-US" dirty="0"/>
+          </a:p>
+          <a:p>
+            <a:pPr marL="0" indent="0">
+              <a:buNone/>
+            </a:pPr>
+            <a:endParaRPr lang="en-US" dirty="0"/>
           </a:p>
         </p:txBody>
       </p:sp>

</xml_diff>